<commit_message>
change the course 4
</commit_message>
<xml_diff>
--- a/document/Python_selenium.pptx
+++ b/document/Python_selenium.pptx
@@ -11,7 +11,8 @@
     <p:sldId id="256" r:id="rId5"/>
     <p:sldId id="258" r:id="rId6"/>
     <p:sldId id="257" r:id="rId7"/>
-    <p:sldId id="259" r:id="rId8"/>
+    <p:sldId id="263" r:id="rId8"/>
+    <p:sldId id="259" r:id="rId9"/>
   </p:sldIdLst>
   <p:sldSz cx="12192000" cy="6858000"/>
   <p:notesSz cx="6858000" cy="9144000"/>
@@ -110,6 +111,11 @@
       </a:defRPr>
     </a:lvl9pPr>
   </p:defaultTextStyle>
+  <p:extLst>
+    <p:ext uri="{EFAFB233-063F-42B5-8137-9DF3F51BA10A}">
+      <p15:sldGuideLst xmlns:p15="http://schemas.microsoft.com/office/powerpoint/2012/main"/>
+    </p:ext>
+  </p:extLst>
 </p:presentation>
 </file>
 
@@ -449,7 +455,7 @@
             <a:fld id="{5923F103-BC34-4FE4-A40E-EDDEECFDA5D0}" type="datetimeFigureOut">
               <a:rPr lang="en-US" dirty="0"/>
               <a:pPr/>
-              <a:t>2/7/18</a:t>
+              <a:t>7/28/18</a:t>
             </a:fld>
             <a:endParaRPr lang="en-US" dirty="0"/>
           </a:p>
@@ -1533,7 +1539,7 @@
           <a:p>
             <a:fld id="{923A1CC3-2375-41D4-9E03-427CAF2A4C1A}" type="datetimeFigureOut">
               <a:rPr lang="en-US" dirty="0"/>
-              <a:t>2/7/18</a:t>
+              <a:t>7/28/18</a:t>
             </a:fld>
             <a:endParaRPr lang="en-US" dirty="0"/>
           </a:p>
@@ -2509,7 +2515,7 @@
           <a:p>
             <a:fld id="{AFF16868-8199-4C2C-A5B1-63AEE139F88E}" type="datetimeFigureOut">
               <a:rPr lang="en-US" dirty="0"/>
-              <a:t>2/7/18</a:t>
+              <a:t>7/28/18</a:t>
             </a:fld>
             <a:endParaRPr lang="en-US" dirty="0"/>
           </a:p>
@@ -3639,7 +3645,7 @@
           <a:p>
             <a:fld id="{AAD9FF7F-6988-44CC-821B-644E70CD2F73}" type="datetimeFigureOut">
               <a:rPr lang="en-US" dirty="0"/>
-              <a:t>2/7/18</a:t>
+              <a:t>7/28/18</a:t>
             </a:fld>
             <a:endParaRPr lang="en-US" dirty="0"/>
           </a:p>
@@ -4668,7 +4674,7 @@
           <a:p>
             <a:fld id="{5C12C299-16B2-4475-990D-751901EACC14}" type="datetimeFigureOut">
               <a:rPr lang="en-US" dirty="0"/>
-              <a:t>2/7/18</a:t>
+              <a:t>7/28/18</a:t>
             </a:fld>
             <a:endParaRPr lang="en-US" dirty="0"/>
           </a:p>
@@ -5324,7 +5330,7 @@
           <a:p>
             <a:fld id="{9FE86839-B9D8-4651-8783-F325ECE74E65}" type="datetimeFigureOut">
               <a:rPr lang="en-US" dirty="0"/>
-              <a:t>2/7/18</a:t>
+              <a:t>7/28/18</a:t>
             </a:fld>
             <a:endParaRPr lang="en-US" dirty="0"/>
           </a:p>
@@ -6181,7 +6187,7 @@
           <a:p>
             <a:fld id="{FD484F64-32F6-45C5-931F-ADC1662401D0}" type="datetimeFigureOut">
               <a:rPr lang="en-US" dirty="0"/>
-              <a:t>2/7/18</a:t>
+              <a:t>7/28/18</a:t>
             </a:fld>
             <a:endParaRPr lang="en-US" dirty="0"/>
           </a:p>
@@ -6367,7 +6373,7 @@
           <a:p>
             <a:fld id="{53086D93-FCAC-47E0-A2EE-787E62CA814C}" type="datetimeFigureOut">
               <a:rPr lang="en-US" dirty="0"/>
-              <a:t>2/7/18</a:t>
+              <a:t>7/28/18</a:t>
             </a:fld>
             <a:endParaRPr lang="en-US" dirty="0"/>
           </a:p>
@@ -7335,7 +7341,7 @@
           <a:p>
             <a:fld id="{CDA879A6-0FD0-4734-A311-86BFCA472E6E}" type="datetimeFigureOut">
               <a:rPr lang="en-US" dirty="0"/>
-              <a:t>2/7/18</a:t>
+              <a:t>7/28/18</a:t>
             </a:fld>
             <a:endParaRPr lang="en-US" dirty="0"/>
           </a:p>
@@ -7542,7 +7548,7 @@
           <a:p>
             <a:fld id="{19C9CA7B-DFD4-44B5-8C60-D14B8CD1FB59}" type="datetimeFigureOut">
               <a:rPr lang="en-US" dirty="0"/>
-              <a:t>2/7/18</a:t>
+              <a:t>7/28/18</a:t>
             </a:fld>
             <a:endParaRPr lang="en-US" dirty="0"/>
           </a:p>
@@ -8572,7 +8578,7 @@
           <a:p>
             <a:fld id="{F34E6425-0181-43F2-84FC-787E803FD2F8}" type="datetimeFigureOut">
               <a:rPr lang="en-US" dirty="0"/>
-              <a:t>2/7/18</a:t>
+              <a:t>7/28/18</a:t>
             </a:fld>
             <a:endParaRPr lang="en-US" dirty="0"/>
           </a:p>
@@ -8840,7 +8846,7 @@
           <a:p>
             <a:fld id="{3BDB8791-F1B0-41E7-B7FD-A781E65C4266}" type="datetimeFigureOut">
               <a:rPr lang="en-US" dirty="0"/>
-              <a:t>2/7/18</a:t>
+              <a:t>7/28/18</a:t>
             </a:fld>
             <a:endParaRPr lang="en-US" dirty="0"/>
           </a:p>
@@ -9246,7 +9252,7 @@
           <a:p>
             <a:fld id="{5FDD63B2-E120-4ED8-B27B-C685F510A5FE}" type="datetimeFigureOut">
               <a:rPr lang="en-US" dirty="0"/>
-              <a:t>2/7/18</a:t>
+              <a:t>7/28/18</a:t>
             </a:fld>
             <a:endParaRPr lang="en-US" dirty="0"/>
           </a:p>
@@ -9369,7 +9375,7 @@
           <a:p>
             <a:fld id="{7AA18ACC-A947-437B-A130-35BD54FDF1E9}" type="datetimeFigureOut">
               <a:rPr lang="en-US" dirty="0"/>
-              <a:t>2/7/18</a:t>
+              <a:t>7/28/18</a:t>
             </a:fld>
             <a:endParaRPr lang="en-US" dirty="0"/>
           </a:p>
@@ -9460,7 +9466,7 @@
           <a:p>
             <a:fld id="{7C8D7E02-BCB8-4D50-A234-369438C08659}" type="datetimeFigureOut">
               <a:rPr lang="en-US" dirty="0"/>
-              <a:t>2/7/18</a:t>
+              <a:t>7/28/18</a:t>
             </a:fld>
             <a:endParaRPr lang="en-US" dirty="0"/>
           </a:p>
@@ -10537,7 +10543,7 @@
           <a:p>
             <a:fld id="{76E86A4C-8E40-4F87-A4F0-01A0687C5742}" type="datetimeFigureOut">
               <a:rPr lang="en-US" dirty="0"/>
-              <a:t>2/7/18</a:t>
+              <a:t>7/28/18</a:t>
             </a:fld>
             <a:endParaRPr lang="en-US" dirty="0"/>
           </a:p>
@@ -11641,7 +11647,7 @@
           <a:p>
             <a:fld id="{35E72C73-2D91-4E12-BA25-F0AA0C03599B}" type="datetimeFigureOut">
               <a:rPr lang="en-US" dirty="0"/>
-              <a:t>2/7/18</a:t>
+              <a:t>7/28/18</a:t>
             </a:fld>
             <a:endParaRPr lang="en-US" dirty="0"/>
           </a:p>
@@ -12634,7 +12640,7 @@
           <a:p>
             <a:fld id="{2BE451C3-0FF4-47C4-B829-773ADF60F88C}" type="datetimeFigureOut">
               <a:rPr lang="en-US" dirty="0"/>
-              <a:t>2/7/18</a:t>
+              <a:t>7/28/18</a:t>
             </a:fld>
             <a:endParaRPr lang="en-US" dirty="0"/>
           </a:p>
@@ -14287,6 +14293,114 @@
           <p:cNvPr id="2" name="Title 1">
             <a:extLst>
               <a:ext uri="{FF2B5EF4-FFF2-40B4-BE49-F238E27FC236}">
+                <a16:creationId xmlns:a16="http://schemas.microsoft.com/office/drawing/2014/main" id="{A7DED1F7-9217-074E-807C-23A6181BE494}"/>
+              </a:ext>
+            </a:extLst>
+          </p:cNvPr>
+          <p:cNvSpPr>
+            <a:spLocks noGrp="1"/>
+          </p:cNvSpPr>
+          <p:nvPr>
+            <p:ph type="title"/>
+          </p:nvPr>
+        </p:nvSpPr>
+        <p:spPr/>
+        <p:txBody>
+          <a:bodyPr/>
+          <a:lstStyle/>
+          <a:p>
+            <a:endParaRPr lang="en-US"/>
+          </a:p>
+        </p:txBody>
+      </p:sp>
+      <p:sp>
+        <p:nvSpPr>
+          <p:cNvPr id="3" name="Content Placeholder 2">
+            <a:extLst>
+              <a:ext uri="{FF2B5EF4-FFF2-40B4-BE49-F238E27FC236}">
+                <a16:creationId xmlns:a16="http://schemas.microsoft.com/office/drawing/2014/main" id="{4F27EC12-043C-6940-8402-EC810B221140}"/>
+              </a:ext>
+            </a:extLst>
+          </p:cNvPr>
+          <p:cNvSpPr>
+            <a:spLocks noGrp="1"/>
+          </p:cNvSpPr>
+          <p:nvPr>
+            <p:ph idx="1"/>
+          </p:nvPr>
+        </p:nvSpPr>
+        <p:spPr/>
+        <p:txBody>
+          <a:bodyPr/>
+          <a:lstStyle/>
+          <a:p>
+            <a:r>
+              <a:rPr lang="en-US" altLang="zh-CN" dirty="0"/>
+              <a:t>p</a:t>
+            </a:r>
+            <a:r>
+              <a:rPr lang="en-US" dirty="0"/>
+              <a:t>ip</a:t>
+            </a:r>
+            <a:r>
+              <a:rPr lang="en-US" altLang="zh-CN" dirty="0"/>
+              <a:t>3</a:t>
+            </a:r>
+            <a:r>
+              <a:rPr lang="zh-CN" altLang="en-US" dirty="0"/>
+              <a:t> </a:t>
+            </a:r>
+            <a:r>
+              <a:rPr lang="en-US" altLang="zh-CN" dirty="0"/>
+              <a:t>install</a:t>
+            </a:r>
+            <a:r>
+              <a:rPr lang="zh-CN" altLang="en-US" dirty="0"/>
+              <a:t> </a:t>
+            </a:r>
+            <a:r>
+              <a:rPr lang="en-CA" dirty="0"/>
+              <a:t>install robotframework-selenium2screenshots</a:t>
+            </a:r>
+            <a:endParaRPr lang="en-US" dirty="0"/>
+          </a:p>
+        </p:txBody>
+      </p:sp>
+    </p:spTree>
+    <p:extLst>
+      <p:ext uri="{BB962C8B-B14F-4D97-AF65-F5344CB8AC3E}">
+        <p14:creationId xmlns:p14="http://schemas.microsoft.com/office/powerpoint/2010/main" val="592631675"/>
+      </p:ext>
+    </p:extLst>
+  </p:cSld>
+  <p:clrMapOvr>
+    <a:masterClrMapping/>
+  </p:clrMapOvr>
+</p:sld>
+</file>
+
+<file path=ppt/slides/slide8.xml><?xml version="1.0" encoding="utf-8"?>
+<p:sld xmlns:a="http://schemas.openxmlformats.org/drawingml/2006/main" xmlns:r="http://schemas.openxmlformats.org/officeDocument/2006/relationships" xmlns:p="http://schemas.openxmlformats.org/presentationml/2006/main">
+  <p:cSld>
+    <p:spTree>
+      <p:nvGrpSpPr>
+        <p:cNvPr id="1" name=""/>
+        <p:cNvGrpSpPr/>
+        <p:nvPr/>
+      </p:nvGrpSpPr>
+      <p:grpSpPr>
+        <a:xfrm>
+          <a:off x="0" y="0"/>
+          <a:ext cx="0" cy="0"/>
+          <a:chOff x="0" y="0"/>
+          <a:chExt cx="0" cy="0"/>
+        </a:xfrm>
+      </p:grpSpPr>
+      <p:sp>
+        <p:nvSpPr>
+          <p:cNvPr id="2" name="Title 1">
+            <a:extLst>
+              <a:ext uri="{FF2B5EF4-FFF2-40B4-BE49-F238E27FC236}">
                 <a16:creationId xmlns:a16="http://schemas.microsoft.com/office/drawing/2014/main" id="{DF0B3EFF-F299-6841-81F4-2C9579E4F3AF}"/>
               </a:ext>
             </a:extLst>

</xml_diff>

<commit_message>
add python db slides
</commit_message>
<xml_diff>
--- a/document/Python_selenium.pptx
+++ b/document/Python_selenium.pptx
@@ -12,7 +12,9 @@
     <p:sldId id="258" r:id="rId6"/>
     <p:sldId id="257" r:id="rId7"/>
     <p:sldId id="263" r:id="rId8"/>
-    <p:sldId id="259" r:id="rId9"/>
+    <p:sldId id="265" r:id="rId9"/>
+    <p:sldId id="264" r:id="rId10"/>
+    <p:sldId id="259" r:id="rId11"/>
   </p:sldIdLst>
   <p:sldSz cx="12192000" cy="6858000"/>
   <p:notesSz cx="6858000" cy="9144000"/>
@@ -13262,6 +13264,114 @@
 </p:sld>
 </file>
 
+<file path=ppt/slides/slide10.xml><?xml version="1.0" encoding="utf-8"?>
+<p:sld xmlns:a="http://schemas.openxmlformats.org/drawingml/2006/main" xmlns:r="http://schemas.openxmlformats.org/officeDocument/2006/relationships" xmlns:p="http://schemas.openxmlformats.org/presentationml/2006/main">
+  <p:cSld>
+    <p:spTree>
+      <p:nvGrpSpPr>
+        <p:cNvPr id="1" name=""/>
+        <p:cNvGrpSpPr/>
+        <p:nvPr/>
+      </p:nvGrpSpPr>
+      <p:grpSpPr>
+        <a:xfrm>
+          <a:off x="0" y="0"/>
+          <a:ext cx="0" cy="0"/>
+          <a:chOff x="0" y="0"/>
+          <a:chExt cx="0" cy="0"/>
+        </a:xfrm>
+      </p:grpSpPr>
+      <p:sp>
+        <p:nvSpPr>
+          <p:cNvPr id="2" name="Title 1">
+            <a:extLst>
+              <a:ext uri="{FF2B5EF4-FFF2-40B4-BE49-F238E27FC236}">
+                <a16:creationId xmlns:a16="http://schemas.microsoft.com/office/drawing/2014/main" id="{DF0B3EFF-F299-6841-81F4-2C9579E4F3AF}"/>
+              </a:ext>
+            </a:extLst>
+          </p:cNvPr>
+          <p:cNvSpPr>
+            <a:spLocks noGrp="1"/>
+          </p:cNvSpPr>
+          <p:nvPr>
+            <p:ph type="title"/>
+          </p:nvPr>
+        </p:nvSpPr>
+        <p:spPr/>
+        <p:txBody>
+          <a:bodyPr/>
+          <a:lstStyle/>
+          <a:p>
+            <a:endParaRPr lang="en-US"/>
+          </a:p>
+        </p:txBody>
+      </p:sp>
+      <p:sp>
+        <p:nvSpPr>
+          <p:cNvPr id="3" name="Content Placeholder 2">
+            <a:extLst>
+              <a:ext uri="{FF2B5EF4-FFF2-40B4-BE49-F238E27FC236}">
+                <a16:creationId xmlns:a16="http://schemas.microsoft.com/office/drawing/2014/main" id="{7EDA00FF-058B-584C-A0B6-57BA42EB5B2D}"/>
+              </a:ext>
+            </a:extLst>
+          </p:cNvPr>
+          <p:cNvSpPr>
+            <a:spLocks noGrp="1"/>
+          </p:cNvSpPr>
+          <p:nvPr>
+            <p:ph idx="1"/>
+          </p:nvPr>
+        </p:nvSpPr>
+        <p:spPr/>
+        <p:txBody>
+          <a:bodyPr/>
+          <a:lstStyle/>
+          <a:p>
+            <a:r>
+              <a:rPr lang="en-CA" dirty="0"/>
+              <a:t>robot </a:t>
+            </a:r>
+            <a:r>
+              <a:rPr lang="en-CA" dirty="0" err="1"/>
+              <a:t>tests.robotrobot</a:t>
+            </a:r>
+            <a:r>
+              <a:rPr lang="en-CA" dirty="0"/>
+              <a:t> --variable </a:t>
+            </a:r>
+            <a:r>
+              <a:rPr lang="en-CA" dirty="0" err="1"/>
+              <a:t>HOST:example.com</a:t>
+            </a:r>
+            <a:r>
+              <a:rPr lang="en-CA" dirty="0"/>
+              <a:t> --</a:t>
+            </a:r>
+            <a:r>
+              <a:rPr lang="en-CA" dirty="0" err="1"/>
+              <a:t>outputdir</a:t>
+            </a:r>
+            <a:r>
+              <a:rPr lang="en-CA" dirty="0"/>
+              <a:t> results path/to/tests/</a:t>
+            </a:r>
+            <a:endParaRPr lang="en-US" dirty="0"/>
+          </a:p>
+        </p:txBody>
+      </p:sp>
+    </p:spTree>
+    <p:extLst>
+      <p:ext uri="{BB962C8B-B14F-4D97-AF65-F5344CB8AC3E}">
+        <p14:creationId xmlns:p14="http://schemas.microsoft.com/office/powerpoint/2010/main" val="90186343"/>
+      </p:ext>
+    </p:extLst>
+  </p:cSld>
+  <p:clrMapOvr>
+    <a:masterClrMapping/>
+  </p:clrMapOvr>
+</p:sld>
+</file>
+
 <file path=ppt/slides/slide2.xml><?xml version="1.0" encoding="utf-8"?>
 <p:sld xmlns:a="http://schemas.openxmlformats.org/drawingml/2006/main" xmlns:r="http://schemas.openxmlformats.org/officeDocument/2006/relationships" xmlns:p="http://schemas.openxmlformats.org/presentationml/2006/main">
   <p:cSld>
@@ -14351,16 +14461,18 @@
               <a:t> </a:t>
             </a:r>
             <a:r>
-              <a:rPr lang="en-US" altLang="zh-CN" dirty="0"/>
-              <a:t>install</a:t>
-            </a:r>
-            <a:r>
-              <a:rPr lang="zh-CN" altLang="en-US" dirty="0"/>
-              <a:t> </a:t>
-            </a:r>
-            <a:r>
               <a:rPr lang="en-CA" dirty="0"/>
               <a:t>install robotframework-selenium2screenshots</a:t>
+            </a:r>
+          </a:p>
+          <a:p>
+            <a:r>
+              <a:rPr lang="en-US" dirty="0"/>
+              <a:t>pip3 install </a:t>
+            </a:r>
+            <a:r>
+              <a:rPr lang="en-US" dirty="0" err="1"/>
+              <a:t>SeleniumLibrary</a:t>
             </a:r>
             <a:endParaRPr lang="en-US" dirty="0"/>
           </a:p>
@@ -14401,7 +14513,7 @@
           <p:cNvPr id="2" name="Title 1">
             <a:extLst>
               <a:ext uri="{FF2B5EF4-FFF2-40B4-BE49-F238E27FC236}">
-                <a16:creationId xmlns:a16="http://schemas.microsoft.com/office/drawing/2014/main" id="{DF0B3EFF-F299-6841-81F4-2C9579E4F3AF}"/>
+                <a16:creationId xmlns:a16="http://schemas.microsoft.com/office/drawing/2014/main" id="{7F324884-4B06-7D40-83FC-11B16F0CED0B}"/>
               </a:ext>
             </a:extLst>
           </p:cNvPr>
@@ -14417,6 +14529,34 @@
           <a:bodyPr/>
           <a:lstStyle/>
           <a:p>
+            <a:r>
+              <a:rPr lang="en-US" altLang="zh-CN" dirty="0"/>
+              <a:t>Run</a:t>
+            </a:r>
+            <a:r>
+              <a:rPr lang="zh-CN" altLang="en-US" dirty="0"/>
+              <a:t> </a:t>
+            </a:r>
+            <a:r>
+              <a:rPr lang="en-US" altLang="zh-CN" dirty="0"/>
+              <a:t>script</a:t>
+            </a:r>
+            <a:r>
+              <a:rPr lang="zh-CN" altLang="en-US" dirty="0"/>
+              <a:t> </a:t>
+            </a:r>
+            <a:r>
+              <a:rPr lang="en-US" altLang="zh-CN" dirty="0"/>
+              <a:t>with</a:t>
+            </a:r>
+            <a:r>
+              <a:rPr lang="zh-CN" altLang="en-US" dirty="0"/>
+              <a:t> </a:t>
+            </a:r>
+            <a:r>
+              <a:rPr lang="en-US" altLang="zh-CN"/>
+              <a:t>tags</a:t>
+            </a:r>
             <a:endParaRPr lang="en-US"/>
           </a:p>
         </p:txBody>
@@ -14426,7 +14566,7 @@
           <p:cNvPr id="3" name="Content Placeholder 2">
             <a:extLst>
               <a:ext uri="{FF2B5EF4-FFF2-40B4-BE49-F238E27FC236}">
-                <a16:creationId xmlns:a16="http://schemas.microsoft.com/office/drawing/2014/main" id="{7EDA00FF-058B-584C-A0B6-57BA42EB5B2D}"/>
+                <a16:creationId xmlns:a16="http://schemas.microsoft.com/office/drawing/2014/main" id="{4EDB6568-EC37-1349-A8C2-B410365069A0}"/>
               </a:ext>
             </a:extLst>
           </p:cNvPr>
@@ -14443,33 +14583,40 @@
           <a:lstStyle/>
           <a:p>
             <a:r>
+              <a:rPr lang="en-US" dirty="0" err="1"/>
+              <a:t>pybot</a:t>
+            </a:r>
+            <a:r>
+              <a:rPr lang="en-US" dirty="0"/>
+              <a:t> </a:t>
+            </a:r>
+            <a:r>
+              <a:rPr lang="en-US" altLang="zh-CN" dirty="0"/>
+              <a:t>--</a:t>
+            </a:r>
+            <a:r>
               <a:rPr lang="en-CA" dirty="0"/>
-              <a:t>robot </a:t>
-            </a:r>
-            <a:r>
-              <a:rPr lang="en-CA" dirty="0" err="1"/>
-              <a:t>tests.robotrobot</a:t>
+              <a:t>variable</a:t>
+            </a:r>
+            <a:r>
+              <a:rPr lang="zh-CN" altLang="en-US" dirty="0"/>
+              <a:t> </a:t>
             </a:r>
             <a:r>
               <a:rPr lang="en-CA" dirty="0"/>
-              <a:t> --variable </a:t>
-            </a:r>
-            <a:r>
-              <a:rPr lang="en-CA" dirty="0" err="1"/>
-              <a:t>HOST:example.com</a:t>
-            </a:r>
-            <a:r>
-              <a:rPr lang="en-CA" dirty="0"/>
-              <a:t> --</a:t>
-            </a:r>
-            <a:r>
-              <a:rPr lang="en-CA" dirty="0" err="1"/>
-              <a:t>outputdir</a:t>
-            </a:r>
-            <a:r>
-              <a:rPr lang="en-CA" dirty="0"/>
-              <a:t> results path/to/tests/</a:t>
-            </a:r>
+              <a:t>BROWSER:IE</a:t>
+            </a:r>
+            <a:r>
+              <a:rPr lang="zh-CN" altLang="en-US" dirty="0"/>
+              <a:t> </a:t>
+            </a:r>
+            <a:r>
+              <a:rPr lang="en-US" dirty="0" err="1"/>
+              <a:t>facebook.robot</a:t>
+            </a:r>
+            <a:endParaRPr lang="en-US" dirty="0"/>
+          </a:p>
+          <a:p>
             <a:endParaRPr lang="en-US" dirty="0"/>
           </a:p>
         </p:txBody>
@@ -14477,7 +14624,138 @@
     </p:spTree>
     <p:extLst>
       <p:ext uri="{BB962C8B-B14F-4D97-AF65-F5344CB8AC3E}">
-        <p14:creationId xmlns:p14="http://schemas.microsoft.com/office/powerpoint/2010/main" val="90186343"/>
+        <p14:creationId xmlns:p14="http://schemas.microsoft.com/office/powerpoint/2010/main" val="1295915624"/>
+      </p:ext>
+    </p:extLst>
+  </p:cSld>
+  <p:clrMapOvr>
+    <a:masterClrMapping/>
+  </p:clrMapOvr>
+</p:sld>
+</file>
+
+<file path=ppt/slides/slide9.xml><?xml version="1.0" encoding="utf-8"?>
+<p:sld xmlns:a="http://schemas.openxmlformats.org/drawingml/2006/main" xmlns:r="http://schemas.openxmlformats.org/officeDocument/2006/relationships" xmlns:p="http://schemas.openxmlformats.org/presentationml/2006/main">
+  <p:cSld>
+    <p:spTree>
+      <p:nvGrpSpPr>
+        <p:cNvPr id="1" name=""/>
+        <p:cNvGrpSpPr/>
+        <p:nvPr/>
+      </p:nvGrpSpPr>
+      <p:grpSpPr>
+        <a:xfrm>
+          <a:off x="0" y="0"/>
+          <a:ext cx="0" cy="0"/>
+          <a:chOff x="0" y="0"/>
+          <a:chExt cx="0" cy="0"/>
+        </a:xfrm>
+      </p:grpSpPr>
+      <p:sp>
+        <p:nvSpPr>
+          <p:cNvPr id="2" name="Title 1">
+            <a:extLst>
+              <a:ext uri="{FF2B5EF4-FFF2-40B4-BE49-F238E27FC236}">
+                <a16:creationId xmlns:a16="http://schemas.microsoft.com/office/drawing/2014/main" id="{640A5271-EDF5-AA42-9950-D02A947C319C}"/>
+              </a:ext>
+            </a:extLst>
+          </p:cNvPr>
+          <p:cNvSpPr>
+            <a:spLocks noGrp="1"/>
+          </p:cNvSpPr>
+          <p:nvPr>
+            <p:ph type="title"/>
+          </p:nvPr>
+        </p:nvSpPr>
+        <p:spPr/>
+        <p:txBody>
+          <a:bodyPr/>
+          <a:lstStyle/>
+          <a:p>
+            <a:r>
+              <a:rPr lang="en-US" altLang="zh-CN" dirty="0"/>
+              <a:t>Run</a:t>
+            </a:r>
+            <a:r>
+              <a:rPr lang="zh-CN" altLang="en-US" dirty="0"/>
+              <a:t> </a:t>
+            </a:r>
+            <a:r>
+              <a:rPr lang="en-US" altLang="zh-CN" dirty="0"/>
+              <a:t>script</a:t>
+            </a:r>
+            <a:r>
+              <a:rPr lang="zh-CN" altLang="en-US" dirty="0"/>
+              <a:t> </a:t>
+            </a:r>
+            <a:r>
+              <a:rPr lang="en-US" altLang="zh-CN" dirty="0"/>
+              <a:t>with</a:t>
+            </a:r>
+            <a:r>
+              <a:rPr lang="zh-CN" altLang="en-US" dirty="0"/>
+              <a:t> </a:t>
+            </a:r>
+            <a:r>
+              <a:rPr lang="en-US" altLang="zh-CN" dirty="0"/>
+              <a:t>tags</a:t>
+            </a:r>
+            <a:endParaRPr lang="en-US" dirty="0"/>
+          </a:p>
+        </p:txBody>
+      </p:sp>
+      <p:sp>
+        <p:nvSpPr>
+          <p:cNvPr id="3" name="Content Placeholder 2">
+            <a:extLst>
+              <a:ext uri="{FF2B5EF4-FFF2-40B4-BE49-F238E27FC236}">
+                <a16:creationId xmlns:a16="http://schemas.microsoft.com/office/drawing/2014/main" id="{486ADFBB-A4E7-0943-8BA7-2B5FB6A0148C}"/>
+              </a:ext>
+            </a:extLst>
+          </p:cNvPr>
+          <p:cNvSpPr>
+            <a:spLocks noGrp="1"/>
+          </p:cNvSpPr>
+          <p:nvPr>
+            <p:ph idx="1"/>
+          </p:nvPr>
+        </p:nvSpPr>
+        <p:spPr/>
+        <p:txBody>
+          <a:bodyPr/>
+          <a:lstStyle/>
+          <a:p>
+            <a:r>
+              <a:rPr lang="en-US" dirty="0" err="1"/>
+              <a:t>pybot</a:t>
+            </a:r>
+            <a:r>
+              <a:rPr lang="en-US" dirty="0"/>
+              <a:t> -</a:t>
+            </a:r>
+            <a:r>
+              <a:rPr lang="en-US" dirty="0" err="1"/>
+              <a:t>i</a:t>
+            </a:r>
+            <a:r>
+              <a:rPr lang="en-US" dirty="0"/>
+              <a:t> 'Functional Test' </a:t>
+            </a:r>
+            <a:r>
+              <a:rPr lang="en-US" dirty="0" err="1"/>
+              <a:t>facebook.robot</a:t>
+            </a:r>
+            <a:endParaRPr lang="en-US" dirty="0"/>
+          </a:p>
+          <a:p>
+            <a:endParaRPr lang="en-US" dirty="0"/>
+          </a:p>
+        </p:txBody>
+      </p:sp>
+    </p:spTree>
+    <p:extLst>
+      <p:ext uri="{BB962C8B-B14F-4D97-AF65-F5344CB8AC3E}">
+        <p14:creationId xmlns:p14="http://schemas.microsoft.com/office/powerpoint/2010/main" val="878656360"/>
       </p:ext>
     </p:extLst>
   </p:cSld>

</xml_diff>

<commit_message>
add all the tests for course 5
</commit_message>
<xml_diff>
--- a/document/Python_selenium.pptx
+++ b/document/Python_selenium.pptx
@@ -457,7 +457,7 @@
             <a:fld id="{5923F103-BC34-4FE4-A40E-EDDEECFDA5D0}" type="datetimeFigureOut">
               <a:rPr lang="en-US" dirty="0"/>
               <a:pPr/>
-              <a:t>7/28/18</a:t>
+              <a:t>12/1/18</a:t>
             </a:fld>
             <a:endParaRPr lang="en-US" dirty="0"/>
           </a:p>
@@ -1541,7 +1541,7 @@
           <a:p>
             <a:fld id="{923A1CC3-2375-41D4-9E03-427CAF2A4C1A}" type="datetimeFigureOut">
               <a:rPr lang="en-US" dirty="0"/>
-              <a:t>7/28/18</a:t>
+              <a:t>12/1/18</a:t>
             </a:fld>
             <a:endParaRPr lang="en-US" dirty="0"/>
           </a:p>
@@ -2517,7 +2517,7 @@
           <a:p>
             <a:fld id="{AFF16868-8199-4C2C-A5B1-63AEE139F88E}" type="datetimeFigureOut">
               <a:rPr lang="en-US" dirty="0"/>
-              <a:t>7/28/18</a:t>
+              <a:t>12/1/18</a:t>
             </a:fld>
             <a:endParaRPr lang="en-US" dirty="0"/>
           </a:p>
@@ -3647,7 +3647,7 @@
           <a:p>
             <a:fld id="{AAD9FF7F-6988-44CC-821B-644E70CD2F73}" type="datetimeFigureOut">
               <a:rPr lang="en-US" dirty="0"/>
-              <a:t>7/28/18</a:t>
+              <a:t>12/1/18</a:t>
             </a:fld>
             <a:endParaRPr lang="en-US" dirty="0"/>
           </a:p>
@@ -4676,7 +4676,7 @@
           <a:p>
             <a:fld id="{5C12C299-16B2-4475-990D-751901EACC14}" type="datetimeFigureOut">
               <a:rPr lang="en-US" dirty="0"/>
-              <a:t>7/28/18</a:t>
+              <a:t>12/1/18</a:t>
             </a:fld>
             <a:endParaRPr lang="en-US" dirty="0"/>
           </a:p>
@@ -5332,7 +5332,7 @@
           <a:p>
             <a:fld id="{9FE86839-B9D8-4651-8783-F325ECE74E65}" type="datetimeFigureOut">
               <a:rPr lang="en-US" dirty="0"/>
-              <a:t>7/28/18</a:t>
+              <a:t>12/1/18</a:t>
             </a:fld>
             <a:endParaRPr lang="en-US" dirty="0"/>
           </a:p>
@@ -6189,7 +6189,7 @@
           <a:p>
             <a:fld id="{FD484F64-32F6-45C5-931F-ADC1662401D0}" type="datetimeFigureOut">
               <a:rPr lang="en-US" dirty="0"/>
-              <a:t>7/28/18</a:t>
+              <a:t>12/1/18</a:t>
             </a:fld>
             <a:endParaRPr lang="en-US" dirty="0"/>
           </a:p>
@@ -6375,7 +6375,7 @@
           <a:p>
             <a:fld id="{53086D93-FCAC-47E0-A2EE-787E62CA814C}" type="datetimeFigureOut">
               <a:rPr lang="en-US" dirty="0"/>
-              <a:t>7/28/18</a:t>
+              <a:t>12/1/18</a:t>
             </a:fld>
             <a:endParaRPr lang="en-US" dirty="0"/>
           </a:p>
@@ -7343,7 +7343,7 @@
           <a:p>
             <a:fld id="{CDA879A6-0FD0-4734-A311-86BFCA472E6E}" type="datetimeFigureOut">
               <a:rPr lang="en-US" dirty="0"/>
-              <a:t>7/28/18</a:t>
+              <a:t>12/1/18</a:t>
             </a:fld>
             <a:endParaRPr lang="en-US" dirty="0"/>
           </a:p>
@@ -7550,7 +7550,7 @@
           <a:p>
             <a:fld id="{19C9CA7B-DFD4-44B5-8C60-D14B8CD1FB59}" type="datetimeFigureOut">
               <a:rPr lang="en-US" dirty="0"/>
-              <a:t>7/28/18</a:t>
+              <a:t>12/1/18</a:t>
             </a:fld>
             <a:endParaRPr lang="en-US" dirty="0"/>
           </a:p>
@@ -8580,7 +8580,7 @@
           <a:p>
             <a:fld id="{F34E6425-0181-43F2-84FC-787E803FD2F8}" type="datetimeFigureOut">
               <a:rPr lang="en-US" dirty="0"/>
-              <a:t>7/28/18</a:t>
+              <a:t>12/1/18</a:t>
             </a:fld>
             <a:endParaRPr lang="en-US" dirty="0"/>
           </a:p>
@@ -8848,7 +8848,7 @@
           <a:p>
             <a:fld id="{3BDB8791-F1B0-41E7-B7FD-A781E65C4266}" type="datetimeFigureOut">
               <a:rPr lang="en-US" dirty="0"/>
-              <a:t>7/28/18</a:t>
+              <a:t>12/1/18</a:t>
             </a:fld>
             <a:endParaRPr lang="en-US" dirty="0"/>
           </a:p>
@@ -9254,7 +9254,7 @@
           <a:p>
             <a:fld id="{5FDD63B2-E120-4ED8-B27B-C685F510A5FE}" type="datetimeFigureOut">
               <a:rPr lang="en-US" dirty="0"/>
-              <a:t>7/28/18</a:t>
+              <a:t>12/1/18</a:t>
             </a:fld>
             <a:endParaRPr lang="en-US" dirty="0"/>
           </a:p>
@@ -9377,7 +9377,7 @@
           <a:p>
             <a:fld id="{7AA18ACC-A947-437B-A130-35BD54FDF1E9}" type="datetimeFigureOut">
               <a:rPr lang="en-US" dirty="0"/>
-              <a:t>7/28/18</a:t>
+              <a:t>12/1/18</a:t>
             </a:fld>
             <a:endParaRPr lang="en-US" dirty="0"/>
           </a:p>
@@ -9468,7 +9468,7 @@
           <a:p>
             <a:fld id="{7C8D7E02-BCB8-4D50-A234-369438C08659}" type="datetimeFigureOut">
               <a:rPr lang="en-US" dirty="0"/>
-              <a:t>7/28/18</a:t>
+              <a:t>12/1/18</a:t>
             </a:fld>
             <a:endParaRPr lang="en-US" dirty="0"/>
           </a:p>
@@ -10545,7 +10545,7 @@
           <a:p>
             <a:fld id="{76E86A4C-8E40-4F87-A4F0-01A0687C5742}" type="datetimeFigureOut">
               <a:rPr lang="en-US" dirty="0"/>
-              <a:t>7/28/18</a:t>
+              <a:t>12/1/18</a:t>
             </a:fld>
             <a:endParaRPr lang="en-US" dirty="0"/>
           </a:p>
@@ -11649,7 +11649,7 @@
           <a:p>
             <a:fld id="{35E72C73-2D91-4E12-BA25-F0AA0C03599B}" type="datetimeFigureOut">
               <a:rPr lang="en-US" dirty="0"/>
-              <a:t>7/28/18</a:t>
+              <a:t>12/1/18</a:t>
             </a:fld>
             <a:endParaRPr lang="en-US" dirty="0"/>
           </a:p>
@@ -12642,7 +12642,7 @@
           <a:p>
             <a:fld id="{2BE451C3-0FF4-47C4-B829-773ADF60F88C}" type="datetimeFigureOut">
               <a:rPr lang="en-US" dirty="0"/>
-              <a:t>7/28/18</a:t>
+              <a:t>12/1/18</a:t>
             </a:fld>
             <a:endParaRPr lang="en-US" dirty="0"/>
           </a:p>
@@ -13355,6 +13355,38 @@
               <a:rPr lang="en-CA" dirty="0"/>
               <a:t> results path/to/tests/</a:t>
             </a:r>
+          </a:p>
+          <a:p>
+            <a:endParaRPr lang="en-CA" dirty="0"/>
+          </a:p>
+          <a:p>
+            <a:endParaRPr lang="en-CA" dirty="0"/>
+          </a:p>
+          <a:p>
+            <a:r>
+              <a:rPr lang="en-US" dirty="0"/>
+              <a:t>https://</a:t>
+            </a:r>
+            <a:r>
+              <a:rPr lang="en-US" dirty="0" err="1"/>
+              <a:t>github.com</a:t>
+            </a:r>
+            <a:r>
+              <a:rPr lang="en-US" dirty="0"/>
+              <a:t>/</a:t>
+            </a:r>
+            <a:r>
+              <a:rPr lang="en-US" dirty="0" err="1"/>
+              <a:t>robotframework</a:t>
+            </a:r>
+            <a:r>
+              <a:rPr lang="en-US" dirty="0"/>
+              <a:t>/</a:t>
+            </a:r>
+            <a:r>
+              <a:rPr lang="en-US"/>
+              <a:t>QuickStartGuide</a:t>
+            </a:r>
             <a:endParaRPr lang="en-US" dirty="0"/>
           </a:p>
         </p:txBody>

</xml_diff>

<commit_message>
add the course 1 ppt
</commit_message>
<xml_diff>
--- a/document/Python_selenium.pptx
+++ b/document/Python_selenium.pptx
@@ -12,7 +12,9 @@
     <p:sldId id="258" r:id="rId6"/>
     <p:sldId id="257" r:id="rId7"/>
     <p:sldId id="263" r:id="rId8"/>
-    <p:sldId id="259" r:id="rId9"/>
+    <p:sldId id="265" r:id="rId9"/>
+    <p:sldId id="264" r:id="rId10"/>
+    <p:sldId id="259" r:id="rId11"/>
   </p:sldIdLst>
   <p:sldSz cx="12192000" cy="6858000"/>
   <p:notesSz cx="6858000" cy="9144000"/>
@@ -13262,6 +13264,114 @@
 </p:sld>
 </file>
 
+<file path=ppt/slides/slide10.xml><?xml version="1.0" encoding="utf-8"?>
+<p:sld xmlns:a="http://schemas.openxmlformats.org/drawingml/2006/main" xmlns:r="http://schemas.openxmlformats.org/officeDocument/2006/relationships" xmlns:p="http://schemas.openxmlformats.org/presentationml/2006/main">
+  <p:cSld>
+    <p:spTree>
+      <p:nvGrpSpPr>
+        <p:cNvPr id="1" name=""/>
+        <p:cNvGrpSpPr/>
+        <p:nvPr/>
+      </p:nvGrpSpPr>
+      <p:grpSpPr>
+        <a:xfrm>
+          <a:off x="0" y="0"/>
+          <a:ext cx="0" cy="0"/>
+          <a:chOff x="0" y="0"/>
+          <a:chExt cx="0" cy="0"/>
+        </a:xfrm>
+      </p:grpSpPr>
+      <p:sp>
+        <p:nvSpPr>
+          <p:cNvPr id="2" name="Title 1">
+            <a:extLst>
+              <a:ext uri="{FF2B5EF4-FFF2-40B4-BE49-F238E27FC236}">
+                <a16:creationId xmlns:a16="http://schemas.microsoft.com/office/drawing/2014/main" id="{DF0B3EFF-F299-6841-81F4-2C9579E4F3AF}"/>
+              </a:ext>
+            </a:extLst>
+          </p:cNvPr>
+          <p:cNvSpPr>
+            <a:spLocks noGrp="1"/>
+          </p:cNvSpPr>
+          <p:nvPr>
+            <p:ph type="title"/>
+          </p:nvPr>
+        </p:nvSpPr>
+        <p:spPr/>
+        <p:txBody>
+          <a:bodyPr/>
+          <a:lstStyle/>
+          <a:p>
+            <a:endParaRPr lang="en-US"/>
+          </a:p>
+        </p:txBody>
+      </p:sp>
+      <p:sp>
+        <p:nvSpPr>
+          <p:cNvPr id="3" name="Content Placeholder 2">
+            <a:extLst>
+              <a:ext uri="{FF2B5EF4-FFF2-40B4-BE49-F238E27FC236}">
+                <a16:creationId xmlns:a16="http://schemas.microsoft.com/office/drawing/2014/main" id="{7EDA00FF-058B-584C-A0B6-57BA42EB5B2D}"/>
+              </a:ext>
+            </a:extLst>
+          </p:cNvPr>
+          <p:cNvSpPr>
+            <a:spLocks noGrp="1"/>
+          </p:cNvSpPr>
+          <p:nvPr>
+            <p:ph idx="1"/>
+          </p:nvPr>
+        </p:nvSpPr>
+        <p:spPr/>
+        <p:txBody>
+          <a:bodyPr/>
+          <a:lstStyle/>
+          <a:p>
+            <a:r>
+              <a:rPr lang="en-CA" dirty="0"/>
+              <a:t>robot </a:t>
+            </a:r>
+            <a:r>
+              <a:rPr lang="en-CA" dirty="0" err="1"/>
+              <a:t>tests.robotrobot</a:t>
+            </a:r>
+            <a:r>
+              <a:rPr lang="en-CA" dirty="0"/>
+              <a:t> --variable </a:t>
+            </a:r>
+            <a:r>
+              <a:rPr lang="en-CA" dirty="0" err="1"/>
+              <a:t>HOST:example.com</a:t>
+            </a:r>
+            <a:r>
+              <a:rPr lang="en-CA" dirty="0"/>
+              <a:t> --</a:t>
+            </a:r>
+            <a:r>
+              <a:rPr lang="en-CA" dirty="0" err="1"/>
+              <a:t>outputdir</a:t>
+            </a:r>
+            <a:r>
+              <a:rPr lang="en-CA" dirty="0"/>
+              <a:t> results path/to/tests/</a:t>
+            </a:r>
+            <a:endParaRPr lang="en-US" dirty="0"/>
+          </a:p>
+        </p:txBody>
+      </p:sp>
+    </p:spTree>
+    <p:extLst>
+      <p:ext uri="{BB962C8B-B14F-4D97-AF65-F5344CB8AC3E}">
+        <p14:creationId xmlns:p14="http://schemas.microsoft.com/office/powerpoint/2010/main" val="90186343"/>
+      </p:ext>
+    </p:extLst>
+  </p:cSld>
+  <p:clrMapOvr>
+    <a:masterClrMapping/>
+  </p:clrMapOvr>
+</p:sld>
+</file>
+
 <file path=ppt/slides/slide2.xml><?xml version="1.0" encoding="utf-8"?>
 <p:sld xmlns:a="http://schemas.openxmlformats.org/drawingml/2006/main" xmlns:r="http://schemas.openxmlformats.org/officeDocument/2006/relationships" xmlns:p="http://schemas.openxmlformats.org/presentationml/2006/main">
   <p:cSld>
@@ -14351,16 +14461,18 @@
               <a:t> </a:t>
             </a:r>
             <a:r>
-              <a:rPr lang="en-US" altLang="zh-CN" dirty="0"/>
-              <a:t>install</a:t>
-            </a:r>
-            <a:r>
-              <a:rPr lang="zh-CN" altLang="en-US" dirty="0"/>
-              <a:t> </a:t>
-            </a:r>
-            <a:r>
               <a:rPr lang="en-CA" dirty="0"/>
               <a:t>install robotframework-selenium2screenshots</a:t>
+            </a:r>
+          </a:p>
+          <a:p>
+            <a:r>
+              <a:rPr lang="en-US" dirty="0"/>
+              <a:t>pip3 install </a:t>
+            </a:r>
+            <a:r>
+              <a:rPr lang="en-US" dirty="0" err="1"/>
+              <a:t>SeleniumLibrary</a:t>
             </a:r>
             <a:endParaRPr lang="en-US" dirty="0"/>
           </a:p>
@@ -14401,7 +14513,7 @@
           <p:cNvPr id="2" name="Title 1">
             <a:extLst>
               <a:ext uri="{FF2B5EF4-FFF2-40B4-BE49-F238E27FC236}">
-                <a16:creationId xmlns:a16="http://schemas.microsoft.com/office/drawing/2014/main" id="{DF0B3EFF-F299-6841-81F4-2C9579E4F3AF}"/>
+                <a16:creationId xmlns:a16="http://schemas.microsoft.com/office/drawing/2014/main" id="{7F324884-4B06-7D40-83FC-11B16F0CED0B}"/>
               </a:ext>
             </a:extLst>
           </p:cNvPr>
@@ -14417,6 +14529,34 @@
           <a:bodyPr/>
           <a:lstStyle/>
           <a:p>
+            <a:r>
+              <a:rPr lang="en-US" altLang="zh-CN" dirty="0"/>
+              <a:t>Run</a:t>
+            </a:r>
+            <a:r>
+              <a:rPr lang="zh-CN" altLang="en-US" dirty="0"/>
+              <a:t> </a:t>
+            </a:r>
+            <a:r>
+              <a:rPr lang="en-US" altLang="zh-CN" dirty="0"/>
+              <a:t>script</a:t>
+            </a:r>
+            <a:r>
+              <a:rPr lang="zh-CN" altLang="en-US" dirty="0"/>
+              <a:t> </a:t>
+            </a:r>
+            <a:r>
+              <a:rPr lang="en-US" altLang="zh-CN" dirty="0"/>
+              <a:t>with</a:t>
+            </a:r>
+            <a:r>
+              <a:rPr lang="zh-CN" altLang="en-US" dirty="0"/>
+              <a:t> </a:t>
+            </a:r>
+            <a:r>
+              <a:rPr lang="en-US" altLang="zh-CN"/>
+              <a:t>tags</a:t>
+            </a:r>
             <a:endParaRPr lang="en-US"/>
           </a:p>
         </p:txBody>
@@ -14426,7 +14566,7 @@
           <p:cNvPr id="3" name="Content Placeholder 2">
             <a:extLst>
               <a:ext uri="{FF2B5EF4-FFF2-40B4-BE49-F238E27FC236}">
-                <a16:creationId xmlns:a16="http://schemas.microsoft.com/office/drawing/2014/main" id="{7EDA00FF-058B-584C-A0B6-57BA42EB5B2D}"/>
+                <a16:creationId xmlns:a16="http://schemas.microsoft.com/office/drawing/2014/main" id="{4EDB6568-EC37-1349-A8C2-B410365069A0}"/>
               </a:ext>
             </a:extLst>
           </p:cNvPr>
@@ -14443,33 +14583,40 @@
           <a:lstStyle/>
           <a:p>
             <a:r>
+              <a:rPr lang="en-US" dirty="0" err="1"/>
+              <a:t>pybot</a:t>
+            </a:r>
+            <a:r>
+              <a:rPr lang="en-US" dirty="0"/>
+              <a:t> </a:t>
+            </a:r>
+            <a:r>
+              <a:rPr lang="en-US" altLang="zh-CN" dirty="0"/>
+              <a:t>--</a:t>
+            </a:r>
+            <a:r>
               <a:rPr lang="en-CA" dirty="0"/>
-              <a:t>robot </a:t>
-            </a:r>
-            <a:r>
-              <a:rPr lang="en-CA" dirty="0" err="1"/>
-              <a:t>tests.robotrobot</a:t>
+              <a:t>variable</a:t>
+            </a:r>
+            <a:r>
+              <a:rPr lang="zh-CN" altLang="en-US" dirty="0"/>
+              <a:t> </a:t>
             </a:r>
             <a:r>
               <a:rPr lang="en-CA" dirty="0"/>
-              <a:t> --variable </a:t>
-            </a:r>
-            <a:r>
-              <a:rPr lang="en-CA" dirty="0" err="1"/>
-              <a:t>HOST:example.com</a:t>
-            </a:r>
-            <a:r>
-              <a:rPr lang="en-CA" dirty="0"/>
-              <a:t> --</a:t>
-            </a:r>
-            <a:r>
-              <a:rPr lang="en-CA" dirty="0" err="1"/>
-              <a:t>outputdir</a:t>
-            </a:r>
-            <a:r>
-              <a:rPr lang="en-CA" dirty="0"/>
-              <a:t> results path/to/tests/</a:t>
-            </a:r>
+              <a:t>BROWSER:IE</a:t>
+            </a:r>
+            <a:r>
+              <a:rPr lang="zh-CN" altLang="en-US" dirty="0"/>
+              <a:t> </a:t>
+            </a:r>
+            <a:r>
+              <a:rPr lang="en-US" dirty="0" err="1"/>
+              <a:t>facebook.robot</a:t>
+            </a:r>
+            <a:endParaRPr lang="en-US" dirty="0"/>
+          </a:p>
+          <a:p>
             <a:endParaRPr lang="en-US" dirty="0"/>
           </a:p>
         </p:txBody>
@@ -14477,7 +14624,138 @@
     </p:spTree>
     <p:extLst>
       <p:ext uri="{BB962C8B-B14F-4D97-AF65-F5344CB8AC3E}">
-        <p14:creationId xmlns:p14="http://schemas.microsoft.com/office/powerpoint/2010/main" val="90186343"/>
+        <p14:creationId xmlns:p14="http://schemas.microsoft.com/office/powerpoint/2010/main" val="1295915624"/>
+      </p:ext>
+    </p:extLst>
+  </p:cSld>
+  <p:clrMapOvr>
+    <a:masterClrMapping/>
+  </p:clrMapOvr>
+</p:sld>
+</file>
+
+<file path=ppt/slides/slide9.xml><?xml version="1.0" encoding="utf-8"?>
+<p:sld xmlns:a="http://schemas.openxmlformats.org/drawingml/2006/main" xmlns:r="http://schemas.openxmlformats.org/officeDocument/2006/relationships" xmlns:p="http://schemas.openxmlformats.org/presentationml/2006/main">
+  <p:cSld>
+    <p:spTree>
+      <p:nvGrpSpPr>
+        <p:cNvPr id="1" name=""/>
+        <p:cNvGrpSpPr/>
+        <p:nvPr/>
+      </p:nvGrpSpPr>
+      <p:grpSpPr>
+        <a:xfrm>
+          <a:off x="0" y="0"/>
+          <a:ext cx="0" cy="0"/>
+          <a:chOff x="0" y="0"/>
+          <a:chExt cx="0" cy="0"/>
+        </a:xfrm>
+      </p:grpSpPr>
+      <p:sp>
+        <p:nvSpPr>
+          <p:cNvPr id="2" name="Title 1">
+            <a:extLst>
+              <a:ext uri="{FF2B5EF4-FFF2-40B4-BE49-F238E27FC236}">
+                <a16:creationId xmlns:a16="http://schemas.microsoft.com/office/drawing/2014/main" id="{640A5271-EDF5-AA42-9950-D02A947C319C}"/>
+              </a:ext>
+            </a:extLst>
+          </p:cNvPr>
+          <p:cNvSpPr>
+            <a:spLocks noGrp="1"/>
+          </p:cNvSpPr>
+          <p:nvPr>
+            <p:ph type="title"/>
+          </p:nvPr>
+        </p:nvSpPr>
+        <p:spPr/>
+        <p:txBody>
+          <a:bodyPr/>
+          <a:lstStyle/>
+          <a:p>
+            <a:r>
+              <a:rPr lang="en-US" altLang="zh-CN" dirty="0"/>
+              <a:t>Run</a:t>
+            </a:r>
+            <a:r>
+              <a:rPr lang="zh-CN" altLang="en-US" dirty="0"/>
+              <a:t> </a:t>
+            </a:r>
+            <a:r>
+              <a:rPr lang="en-US" altLang="zh-CN" dirty="0"/>
+              <a:t>script</a:t>
+            </a:r>
+            <a:r>
+              <a:rPr lang="zh-CN" altLang="en-US" dirty="0"/>
+              <a:t> </a:t>
+            </a:r>
+            <a:r>
+              <a:rPr lang="en-US" altLang="zh-CN" dirty="0"/>
+              <a:t>with</a:t>
+            </a:r>
+            <a:r>
+              <a:rPr lang="zh-CN" altLang="en-US" dirty="0"/>
+              <a:t> </a:t>
+            </a:r>
+            <a:r>
+              <a:rPr lang="en-US" altLang="zh-CN" dirty="0"/>
+              <a:t>tags</a:t>
+            </a:r>
+            <a:endParaRPr lang="en-US" dirty="0"/>
+          </a:p>
+        </p:txBody>
+      </p:sp>
+      <p:sp>
+        <p:nvSpPr>
+          <p:cNvPr id="3" name="Content Placeholder 2">
+            <a:extLst>
+              <a:ext uri="{FF2B5EF4-FFF2-40B4-BE49-F238E27FC236}">
+                <a16:creationId xmlns:a16="http://schemas.microsoft.com/office/drawing/2014/main" id="{486ADFBB-A4E7-0943-8BA7-2B5FB6A0148C}"/>
+              </a:ext>
+            </a:extLst>
+          </p:cNvPr>
+          <p:cNvSpPr>
+            <a:spLocks noGrp="1"/>
+          </p:cNvSpPr>
+          <p:nvPr>
+            <p:ph idx="1"/>
+          </p:nvPr>
+        </p:nvSpPr>
+        <p:spPr/>
+        <p:txBody>
+          <a:bodyPr/>
+          <a:lstStyle/>
+          <a:p>
+            <a:r>
+              <a:rPr lang="en-US" dirty="0" err="1"/>
+              <a:t>pybot</a:t>
+            </a:r>
+            <a:r>
+              <a:rPr lang="en-US" dirty="0"/>
+              <a:t> -</a:t>
+            </a:r>
+            <a:r>
+              <a:rPr lang="en-US" dirty="0" err="1"/>
+              <a:t>i</a:t>
+            </a:r>
+            <a:r>
+              <a:rPr lang="en-US" dirty="0"/>
+              <a:t> 'Functional Test' </a:t>
+            </a:r>
+            <a:r>
+              <a:rPr lang="en-US" dirty="0" err="1"/>
+              <a:t>facebook.robot</a:t>
+            </a:r>
+            <a:endParaRPr lang="en-US" dirty="0"/>
+          </a:p>
+          <a:p>
+            <a:endParaRPr lang="en-US" dirty="0"/>
+          </a:p>
+        </p:txBody>
+      </p:sp>
+    </p:spTree>
+    <p:extLst>
+      <p:ext uri="{BB962C8B-B14F-4D97-AF65-F5344CB8AC3E}">
+        <p14:creationId xmlns:p14="http://schemas.microsoft.com/office/powerpoint/2010/main" val="878656360"/>
       </p:ext>
     </p:extLst>
   </p:cSld>

</xml_diff>